<commit_message>
Worked on 423 hw01
</commit_message>
<xml_diff>
--- a/MSiA 423/hw01/hw01_deck.pptx
+++ b/MSiA 423/hw01/hw01_deck.pptx
@@ -108,6 +108,11 @@
       </a:defRPr>
     </a:lvl9pPr>
   </p:defaultTextStyle>
+  <p:extLst>
+    <p:ext uri="{EFAFB233-063F-42B5-8137-9DF3F51BA10A}">
+      <p15:sldGuideLst xmlns:p15="http://schemas.microsoft.com/office/powerpoint/2012/main"/>
+    </p:ext>
+  </p:extLst>
 </p:presentation>
 </file>
 
@@ -241,7 +246,7 @@
           </a:lstStyle>
           <a:p>
             <a:r>
-              <a:rPr lang="en-US" smtClean="0"/>
+              <a:rPr lang="en-US"/>
               <a:t>Click to edit Master title style</a:t>
             </a:r>
             <a:endParaRPr lang="en-US" dirty="0"/>
@@ -313,7 +318,7 @@
           </a:lstStyle>
           <a:p>
             <a:r>
-              <a:rPr lang="en-US" smtClean="0"/>
+              <a:rPr lang="en-US"/>
               <a:t>Click to edit Master subtitle style</a:t>
             </a:r>
             <a:endParaRPr lang="en-US" dirty="0"/>
@@ -337,7 +342,7 @@
           <a:p>
             <a:fld id="{84C7F18E-0E49-4207-B837-F7024745D32F}" type="datetimeFigureOut">
               <a:rPr lang="en-US" smtClean="0"/>
-              <a:t>4/12/2023</a:t>
+              <a:t>4/13/2023</a:t>
             </a:fld>
             <a:endParaRPr lang="en-US"/>
           </a:p>
@@ -469,7 +474,7 @@
           <a:lstStyle/>
           <a:p>
             <a:r>
-              <a:rPr lang="en-US" smtClean="0"/>
+              <a:rPr lang="en-US"/>
               <a:t>Click to edit Master title style</a:t>
             </a:r>
             <a:endParaRPr lang="en-US" dirty="0"/>
@@ -493,35 +498,35 @@
           <a:p>
             <a:pPr lvl="0"/>
             <a:r>
-              <a:rPr lang="en-US" smtClean="0"/>
+              <a:rPr lang="en-US"/>
               <a:t>Click to edit Master text styles</a:t>
             </a:r>
           </a:p>
           <a:p>
             <a:pPr lvl="1"/>
             <a:r>
-              <a:rPr lang="en-US" smtClean="0"/>
+              <a:rPr lang="en-US"/>
               <a:t>Second level</a:t>
             </a:r>
           </a:p>
           <a:p>
             <a:pPr lvl="2"/>
             <a:r>
-              <a:rPr lang="en-US" smtClean="0"/>
+              <a:rPr lang="en-US"/>
               <a:t>Third level</a:t>
             </a:r>
           </a:p>
           <a:p>
             <a:pPr lvl="3"/>
             <a:r>
-              <a:rPr lang="en-US" smtClean="0"/>
+              <a:rPr lang="en-US"/>
               <a:t>Fourth level</a:t>
             </a:r>
           </a:p>
           <a:p>
             <a:pPr lvl="4"/>
             <a:r>
-              <a:rPr lang="en-US" smtClean="0"/>
+              <a:rPr lang="en-US"/>
               <a:t>Fifth level</a:t>
             </a:r>
             <a:endParaRPr lang="en-US" dirty="0"/>
@@ -545,7 +550,7 @@
           <a:p>
             <a:fld id="{84C7F18E-0E49-4207-B837-F7024745D32F}" type="datetimeFigureOut">
               <a:rPr lang="en-US" smtClean="0"/>
-              <a:t>4/12/2023</a:t>
+              <a:t>4/13/2023</a:t>
             </a:fld>
             <a:endParaRPr lang="en-US"/>
           </a:p>
@@ -720,7 +725,7 @@
           <a:lstStyle/>
           <a:p>
             <a:r>
-              <a:rPr lang="en-US" smtClean="0"/>
+              <a:rPr lang="en-US"/>
               <a:t>Click to edit Master title style</a:t>
             </a:r>
             <a:endParaRPr lang="en-US" dirty="0"/>
@@ -749,35 +754,35 @@
           <a:p>
             <a:pPr lvl="0"/>
             <a:r>
-              <a:rPr lang="en-US" smtClean="0"/>
+              <a:rPr lang="en-US"/>
               <a:t>Click to edit Master text styles</a:t>
             </a:r>
           </a:p>
           <a:p>
             <a:pPr lvl="1"/>
             <a:r>
-              <a:rPr lang="en-US" smtClean="0"/>
+              <a:rPr lang="en-US"/>
               <a:t>Second level</a:t>
             </a:r>
           </a:p>
           <a:p>
             <a:pPr lvl="2"/>
             <a:r>
-              <a:rPr lang="en-US" smtClean="0"/>
+              <a:rPr lang="en-US"/>
               <a:t>Third level</a:t>
             </a:r>
           </a:p>
           <a:p>
             <a:pPr lvl="3"/>
             <a:r>
-              <a:rPr lang="en-US" smtClean="0"/>
+              <a:rPr lang="en-US"/>
               <a:t>Fourth level</a:t>
             </a:r>
           </a:p>
           <a:p>
             <a:pPr lvl="4"/>
             <a:r>
-              <a:rPr lang="en-US" smtClean="0"/>
+              <a:rPr lang="en-US"/>
               <a:t>Fifth level</a:t>
             </a:r>
             <a:endParaRPr lang="en-US" dirty="0"/>
@@ -801,7 +806,7 @@
           <a:p>
             <a:fld id="{84C7F18E-0E49-4207-B837-F7024745D32F}" type="datetimeFigureOut">
               <a:rPr lang="en-US" smtClean="0"/>
-              <a:t>4/12/2023</a:t>
+              <a:t>4/13/2023</a:t>
             </a:fld>
             <a:endParaRPr lang="en-US"/>
           </a:p>
@@ -899,7 +904,7 @@
           </a:lstStyle>
           <a:p>
             <a:r>
-              <a:rPr lang="en-US" smtClean="0"/>
+              <a:rPr lang="en-US"/>
               <a:t>Click to edit Master title style</a:t>
             </a:r>
             <a:endParaRPr lang="en-US" dirty="0"/>
@@ -923,35 +928,35 @@
           <a:p>
             <a:pPr lvl="0"/>
             <a:r>
-              <a:rPr lang="en-US" smtClean="0"/>
+              <a:rPr lang="en-US"/>
               <a:t>Click to edit Master text styles</a:t>
             </a:r>
           </a:p>
           <a:p>
             <a:pPr lvl="1"/>
             <a:r>
-              <a:rPr lang="en-US" smtClean="0"/>
+              <a:rPr lang="en-US"/>
               <a:t>Second level</a:t>
             </a:r>
           </a:p>
           <a:p>
             <a:pPr lvl="2"/>
             <a:r>
-              <a:rPr lang="en-US" smtClean="0"/>
+              <a:rPr lang="en-US"/>
               <a:t>Third level</a:t>
             </a:r>
           </a:p>
           <a:p>
             <a:pPr lvl="3"/>
             <a:r>
-              <a:rPr lang="en-US" smtClean="0"/>
+              <a:rPr lang="en-US"/>
               <a:t>Fourth level</a:t>
             </a:r>
           </a:p>
           <a:p>
             <a:pPr lvl="4"/>
             <a:r>
-              <a:rPr lang="en-US" smtClean="0"/>
+              <a:rPr lang="en-US"/>
               <a:t>Fifth level</a:t>
             </a:r>
             <a:endParaRPr lang="en-US" dirty="0"/>
@@ -975,7 +980,7 @@
           <a:p>
             <a:fld id="{84C7F18E-0E49-4207-B837-F7024745D32F}" type="datetimeFigureOut">
               <a:rPr lang="en-US" smtClean="0"/>
-              <a:t>4/12/2023</a:t>
+              <a:t>4/13/2023</a:t>
             </a:fld>
             <a:endParaRPr lang="en-US"/>
           </a:p>
@@ -1174,7 +1179,7 @@
           </a:lstStyle>
           <a:p>
             <a:r>
-              <a:rPr lang="en-US" smtClean="0"/>
+              <a:rPr lang="en-US"/>
               <a:t>Click to edit Master title style</a:t>
             </a:r>
             <a:endParaRPr lang="en-US" dirty="0"/>
@@ -1295,7 +1300,7 @@
           <a:p>
             <a:pPr lvl="0"/>
             <a:r>
-              <a:rPr lang="en-US" smtClean="0"/>
+              <a:rPr lang="en-US"/>
               <a:t>Click to edit Master text styles</a:t>
             </a:r>
           </a:p>
@@ -1318,7 +1323,7 @@
           <a:p>
             <a:fld id="{84C7F18E-0E49-4207-B837-F7024745D32F}" type="datetimeFigureOut">
               <a:rPr lang="en-US" smtClean="0"/>
-              <a:t>4/12/2023</a:t>
+              <a:t>4/13/2023</a:t>
             </a:fld>
             <a:endParaRPr lang="en-US"/>
           </a:p>
@@ -1455,7 +1460,7 @@
           <a:lstStyle/>
           <a:p>
             <a:r>
-              <a:rPr lang="en-US" smtClean="0"/>
+              <a:rPr lang="en-US"/>
               <a:t>Click to edit Master title style</a:t>
             </a:r>
             <a:endParaRPr lang="en-US" dirty="0"/>
@@ -1484,35 +1489,35 @@
           <a:p>
             <a:pPr lvl="0"/>
             <a:r>
-              <a:rPr lang="en-US" smtClean="0"/>
+              <a:rPr lang="en-US"/>
               <a:t>Click to edit Master text styles</a:t>
             </a:r>
           </a:p>
           <a:p>
             <a:pPr lvl="1"/>
             <a:r>
-              <a:rPr lang="en-US" smtClean="0"/>
+              <a:rPr lang="en-US"/>
               <a:t>Second level</a:t>
             </a:r>
           </a:p>
           <a:p>
             <a:pPr lvl="2"/>
             <a:r>
-              <a:rPr lang="en-US" smtClean="0"/>
+              <a:rPr lang="en-US"/>
               <a:t>Third level</a:t>
             </a:r>
           </a:p>
           <a:p>
             <a:pPr lvl="3"/>
             <a:r>
-              <a:rPr lang="en-US" smtClean="0"/>
+              <a:rPr lang="en-US"/>
               <a:t>Fourth level</a:t>
             </a:r>
           </a:p>
           <a:p>
             <a:pPr lvl="4"/>
             <a:r>
-              <a:rPr lang="en-US" smtClean="0"/>
+              <a:rPr lang="en-US"/>
               <a:t>Fifth level</a:t>
             </a:r>
             <a:endParaRPr lang="en-US" dirty="0"/>
@@ -1541,35 +1546,35 @@
           <a:p>
             <a:pPr lvl="0"/>
             <a:r>
-              <a:rPr lang="en-US" smtClean="0"/>
+              <a:rPr lang="en-US"/>
               <a:t>Click to edit Master text styles</a:t>
             </a:r>
           </a:p>
           <a:p>
             <a:pPr lvl="1"/>
             <a:r>
-              <a:rPr lang="en-US" smtClean="0"/>
+              <a:rPr lang="en-US"/>
               <a:t>Second level</a:t>
             </a:r>
           </a:p>
           <a:p>
             <a:pPr lvl="2"/>
             <a:r>
-              <a:rPr lang="en-US" smtClean="0"/>
+              <a:rPr lang="en-US"/>
               <a:t>Third level</a:t>
             </a:r>
           </a:p>
           <a:p>
             <a:pPr lvl="3"/>
             <a:r>
-              <a:rPr lang="en-US" smtClean="0"/>
+              <a:rPr lang="en-US"/>
               <a:t>Fourth level</a:t>
             </a:r>
           </a:p>
           <a:p>
             <a:pPr lvl="4"/>
             <a:r>
-              <a:rPr lang="en-US" smtClean="0"/>
+              <a:rPr lang="en-US"/>
               <a:t>Fifth level</a:t>
             </a:r>
             <a:endParaRPr lang="en-US" dirty="0"/>
@@ -1593,7 +1598,7 @@
           <a:p>
             <a:fld id="{84C7F18E-0E49-4207-B837-F7024745D32F}" type="datetimeFigureOut">
               <a:rPr lang="en-US" smtClean="0"/>
-              <a:t>4/12/2023</a:t>
+              <a:t>4/13/2023</a:t>
             </a:fld>
             <a:endParaRPr lang="en-US"/>
           </a:p>
@@ -1692,7 +1697,7 @@
           <a:lstStyle/>
           <a:p>
             <a:r>
-              <a:rPr lang="en-US" smtClean="0"/>
+              <a:rPr lang="en-US"/>
               <a:t>Click to edit Master title style</a:t>
             </a:r>
             <a:endParaRPr lang="en-US" dirty="0"/>
@@ -1764,7 +1769,7 @@
           <a:p>
             <a:pPr lvl="0"/>
             <a:r>
-              <a:rPr lang="en-US" smtClean="0"/>
+              <a:rPr lang="en-US"/>
               <a:t>Click to edit Master text styles</a:t>
             </a:r>
           </a:p>
@@ -1792,35 +1797,35 @@
           <a:p>
             <a:pPr lvl="0"/>
             <a:r>
-              <a:rPr lang="en-US" smtClean="0"/>
+              <a:rPr lang="en-US"/>
               <a:t>Click to edit Master text styles</a:t>
             </a:r>
           </a:p>
           <a:p>
             <a:pPr lvl="1"/>
             <a:r>
-              <a:rPr lang="en-US" smtClean="0"/>
+              <a:rPr lang="en-US"/>
               <a:t>Second level</a:t>
             </a:r>
           </a:p>
           <a:p>
             <a:pPr lvl="2"/>
             <a:r>
-              <a:rPr lang="en-US" smtClean="0"/>
+              <a:rPr lang="en-US"/>
               <a:t>Third level</a:t>
             </a:r>
           </a:p>
           <a:p>
             <a:pPr lvl="3"/>
             <a:r>
-              <a:rPr lang="en-US" smtClean="0"/>
+              <a:rPr lang="en-US"/>
               <a:t>Fourth level</a:t>
             </a:r>
           </a:p>
           <a:p>
             <a:pPr lvl="4"/>
             <a:r>
-              <a:rPr lang="en-US" smtClean="0"/>
+              <a:rPr lang="en-US"/>
               <a:t>Fifth level</a:t>
             </a:r>
             <a:endParaRPr lang="en-US" dirty="0"/>
@@ -1892,7 +1897,7 @@
           <a:p>
             <a:pPr lvl="0"/>
             <a:r>
-              <a:rPr lang="en-US" smtClean="0"/>
+              <a:rPr lang="en-US"/>
               <a:t>Click to edit Master text styles</a:t>
             </a:r>
           </a:p>
@@ -1920,35 +1925,35 @@
           <a:p>
             <a:pPr lvl="0"/>
             <a:r>
-              <a:rPr lang="en-US" smtClean="0"/>
+              <a:rPr lang="en-US"/>
               <a:t>Click to edit Master text styles</a:t>
             </a:r>
           </a:p>
           <a:p>
             <a:pPr lvl="1"/>
             <a:r>
-              <a:rPr lang="en-US" smtClean="0"/>
+              <a:rPr lang="en-US"/>
               <a:t>Second level</a:t>
             </a:r>
           </a:p>
           <a:p>
             <a:pPr lvl="2"/>
             <a:r>
-              <a:rPr lang="en-US" smtClean="0"/>
+              <a:rPr lang="en-US"/>
               <a:t>Third level</a:t>
             </a:r>
           </a:p>
           <a:p>
             <a:pPr lvl="3"/>
             <a:r>
-              <a:rPr lang="en-US" smtClean="0"/>
+              <a:rPr lang="en-US"/>
               <a:t>Fourth level</a:t>
             </a:r>
           </a:p>
           <a:p>
             <a:pPr lvl="4"/>
             <a:r>
-              <a:rPr lang="en-US" smtClean="0"/>
+              <a:rPr lang="en-US"/>
               <a:t>Fifth level</a:t>
             </a:r>
             <a:endParaRPr lang="en-US" dirty="0"/>
@@ -1972,7 +1977,7 @@
           <a:p>
             <a:fld id="{84C7F18E-0E49-4207-B837-F7024745D32F}" type="datetimeFigureOut">
               <a:rPr lang="en-US" smtClean="0"/>
-              <a:t>4/12/2023</a:t>
+              <a:t>4/13/2023</a:t>
             </a:fld>
             <a:endParaRPr lang="en-US"/>
           </a:p>
@@ -2066,7 +2071,7 @@
           <a:lstStyle/>
           <a:p>
             <a:r>
-              <a:rPr lang="en-US" smtClean="0"/>
+              <a:rPr lang="en-US"/>
               <a:t>Click to edit Master title style</a:t>
             </a:r>
             <a:endParaRPr lang="en-US" dirty="0"/>
@@ -2090,7 +2095,7 @@
           <a:p>
             <a:fld id="{84C7F18E-0E49-4207-B837-F7024745D32F}" type="datetimeFigureOut">
               <a:rPr lang="en-US" smtClean="0"/>
-              <a:t>4/12/2023</a:t>
+              <a:t>4/13/2023</a:t>
             </a:fld>
             <a:endParaRPr lang="en-US"/>
           </a:p>
@@ -2261,7 +2266,7 @@
           <a:p>
             <a:fld id="{84C7F18E-0E49-4207-B837-F7024745D32F}" type="datetimeFigureOut">
               <a:rPr lang="en-US" smtClean="0"/>
-              <a:t>4/12/2023</a:t>
+              <a:t>4/13/2023</a:t>
             </a:fld>
             <a:endParaRPr lang="en-US"/>
           </a:p>
@@ -2454,7 +2459,7 @@
           </a:lstStyle>
           <a:p>
             <a:r>
-              <a:rPr lang="en-US" smtClean="0"/>
+              <a:rPr lang="en-US"/>
               <a:t>Click to edit Master title style</a:t>
             </a:r>
             <a:endParaRPr lang="en-US" dirty="0"/>
@@ -2483,35 +2488,35 @@
           <a:p>
             <a:pPr lvl="0"/>
             <a:r>
-              <a:rPr lang="en-US" smtClean="0"/>
+              <a:rPr lang="en-US"/>
               <a:t>Click to edit Master text styles</a:t>
             </a:r>
           </a:p>
           <a:p>
             <a:pPr lvl="1"/>
             <a:r>
-              <a:rPr lang="en-US" smtClean="0"/>
+              <a:rPr lang="en-US"/>
               <a:t>Second level</a:t>
             </a:r>
           </a:p>
           <a:p>
             <a:pPr lvl="2"/>
             <a:r>
-              <a:rPr lang="en-US" smtClean="0"/>
+              <a:rPr lang="en-US"/>
               <a:t>Third level</a:t>
             </a:r>
           </a:p>
           <a:p>
             <a:pPr lvl="3"/>
             <a:r>
-              <a:rPr lang="en-US" smtClean="0"/>
+              <a:rPr lang="en-US"/>
               <a:t>Fourth level</a:t>
             </a:r>
           </a:p>
           <a:p>
             <a:pPr lvl="4"/>
             <a:r>
-              <a:rPr lang="en-US" smtClean="0"/>
+              <a:rPr lang="en-US"/>
               <a:t>Fifth level</a:t>
             </a:r>
             <a:endParaRPr lang="en-US" dirty="0"/>
@@ -2583,7 +2588,7 @@
           <a:p>
             <a:pPr lvl="0"/>
             <a:r>
-              <a:rPr lang="en-US" smtClean="0"/>
+              <a:rPr lang="en-US"/>
               <a:t>Click to edit Master text styles</a:t>
             </a:r>
           </a:p>
@@ -2615,7 +2620,7 @@
           <a:p>
             <a:fld id="{84C7F18E-0E49-4207-B837-F7024745D32F}" type="datetimeFigureOut">
               <a:rPr lang="en-US" smtClean="0"/>
-              <a:t>4/12/2023</a:t>
+              <a:t>4/13/2023</a:t>
             </a:fld>
             <a:endParaRPr lang="en-US"/>
           </a:p>
@@ -2821,7 +2826,7 @@
           </a:lstStyle>
           <a:p>
             <a:r>
-              <a:rPr lang="en-US" smtClean="0"/>
+              <a:rPr lang="en-US"/>
               <a:t>Click to edit Master title style</a:t>
             </a:r>
             <a:endParaRPr lang="en-US" dirty="0"/>
@@ -2896,7 +2901,7 @@
           </a:lstStyle>
           <a:p>
             <a:r>
-              <a:rPr lang="en-US" smtClean="0"/>
+              <a:rPr lang="en-US"/>
               <a:t>Click icon to add picture</a:t>
             </a:r>
             <a:endParaRPr lang="en-US" dirty="0"/>
@@ -2974,7 +2979,7 @@
           <a:p>
             <a:pPr lvl="0"/>
             <a:r>
-              <a:rPr lang="en-US" smtClean="0"/>
+              <a:rPr lang="en-US"/>
               <a:t>Click to edit Master text styles</a:t>
             </a:r>
           </a:p>
@@ -2997,7 +3002,7 @@
           <a:p>
             <a:fld id="{84C7F18E-0E49-4207-B837-F7024745D32F}" type="datetimeFigureOut">
               <a:rPr lang="en-US" smtClean="0"/>
-              <a:t>4/12/2023</a:t>
+              <a:t>4/13/2023</a:t>
             </a:fld>
             <a:endParaRPr lang="en-US"/>
           </a:p>
@@ -3182,7 +3187,7 @@
           <a:lstStyle/>
           <a:p>
             <a:r>
-              <a:rPr lang="en-US" smtClean="0"/>
+              <a:rPr lang="en-US"/>
               <a:t>Click to edit Master title style</a:t>
             </a:r>
             <a:endParaRPr lang="en-US" dirty="0"/>
@@ -3216,35 +3221,35 @@
           <a:p>
             <a:pPr lvl="0"/>
             <a:r>
-              <a:rPr lang="en-US" smtClean="0"/>
+              <a:rPr lang="en-US"/>
               <a:t>Click to edit Master text styles</a:t>
             </a:r>
           </a:p>
           <a:p>
             <a:pPr lvl="1"/>
             <a:r>
-              <a:rPr lang="en-US" smtClean="0"/>
+              <a:rPr lang="en-US"/>
               <a:t>Second level</a:t>
             </a:r>
           </a:p>
           <a:p>
             <a:pPr lvl="2"/>
             <a:r>
-              <a:rPr lang="en-US" smtClean="0"/>
+              <a:rPr lang="en-US"/>
               <a:t>Third level</a:t>
             </a:r>
           </a:p>
           <a:p>
             <a:pPr lvl="3"/>
             <a:r>
-              <a:rPr lang="en-US" smtClean="0"/>
+              <a:rPr lang="en-US"/>
               <a:t>Fourth level</a:t>
             </a:r>
           </a:p>
           <a:p>
             <a:pPr lvl="4"/>
             <a:r>
-              <a:rPr lang="en-US" smtClean="0"/>
+              <a:rPr lang="en-US"/>
               <a:t>Fifth level</a:t>
             </a:r>
             <a:endParaRPr lang="en-US" dirty="0"/>
@@ -3284,7 +3289,7 @@
           <a:p>
             <a:fld id="{84C7F18E-0E49-4207-B837-F7024745D32F}" type="datetimeFigureOut">
               <a:rPr lang="en-US" smtClean="0"/>
-              <a:t>4/12/2023</a:t>
+              <a:t>4/13/2023</a:t>
             </a:fld>
             <a:endParaRPr lang="en-US"/>
           </a:p>
@@ -3824,10 +3829,9 @@
           <a:lstStyle/>
           <a:p>
             <a:r>
-              <a:rPr lang="en-US" dirty="0" smtClean="0"/>
+              <a:rPr lang="en-US" dirty="0"/>
               <a:t>Homework 01</a:t>
             </a:r>
-            <a:endParaRPr lang="en-US" dirty="0"/>
           </a:p>
         </p:txBody>
       </p:sp>
@@ -3847,10 +3851,9 @@
           <a:lstStyle/>
           <a:p>
             <a:r>
-              <a:rPr lang="en-US" dirty="0" smtClean="0"/>
+              <a:rPr lang="en-US" dirty="0"/>
               <a:t>Samuel Swain (SMS5736)</a:t>
             </a:r>
-            <a:endParaRPr lang="en-US" dirty="0"/>
           </a:p>
         </p:txBody>
       </p:sp>
@@ -3900,10 +3903,9 @@
           <a:lstStyle/>
           <a:p>
             <a:r>
-              <a:rPr lang="en-US" dirty="0" smtClean="0"/>
+              <a:rPr lang="en-US" dirty="0"/>
               <a:t>Data</a:t>
             </a:r>
-            <a:endParaRPr lang="en-US" dirty="0"/>
           </a:p>
         </p:txBody>
       </p:sp>
@@ -4179,7 +4181,7 @@
               <a:buNone/>
             </a:pPr>
             <a:r>
-              <a:rPr lang="en-US" b="1" dirty="0" smtClean="0"/>
+              <a:rPr lang="en-US" b="1" dirty="0"/>
               <a:t>Chart Information </a:t>
             </a:r>
           </a:p>
@@ -4224,28 +4226,19 @@
               <a:rPr lang="en-US" sz="1700" dirty="0"/>
               <a:t>Active problems/diagnoses </a:t>
             </a:r>
-            <a:endParaRPr lang="en-US" sz="1700" dirty="0" smtClean="0"/>
           </a:p>
           <a:p>
             <a:pPr lvl="1"/>
             <a:r>
-              <a:rPr lang="en-US" sz="1700" dirty="0" smtClean="0"/>
-              <a:t>History </a:t>
-            </a:r>
-            <a:r>
               <a:rPr lang="en-US" sz="1700" dirty="0"/>
-              <a:t>of present illness (HPI)</a:t>
+              <a:t>History of present illness (HPI)</a:t>
             </a:r>
           </a:p>
           <a:p>
             <a:pPr lvl="1"/>
             <a:r>
-              <a:rPr lang="en-US" sz="1700" dirty="0" smtClean="0"/>
-              <a:t>Physical </a:t>
-            </a:r>
-            <a:r>
               <a:rPr lang="en-US" sz="1700" dirty="0"/>
-              <a:t>examination (including vital signs)</a:t>
+              <a:t>Physical examination (including vital signs)</a:t>
             </a:r>
           </a:p>
           <a:p>
@@ -4254,7 +4247,6 @@
               <a:rPr lang="en-US" sz="1700" dirty="0"/>
               <a:t>Results of medical tests and imaging studies</a:t>
             </a:r>
-            <a:endParaRPr lang="en-US" sz="1700" dirty="0" smtClean="0"/>
           </a:p>
         </p:txBody>
       </p:sp>
@@ -4530,7 +4522,7 @@
               <a:buNone/>
             </a:pPr>
             <a:r>
-              <a:rPr lang="en-US" b="1" dirty="0" smtClean="0"/>
+              <a:rPr lang="en-US" b="1" dirty="0"/>
               <a:t>Patient History</a:t>
             </a:r>
           </a:p>
@@ -4538,74 +4530,42 @@
             <a:pPr lvl="1"/>
             <a:r>
               <a:rPr lang="en-US" sz="1600" dirty="0"/>
-              <a:t>History of present illness (HPI</a:t>
-            </a:r>
-            <a:r>
-              <a:rPr lang="en-US" sz="1600" dirty="0" smtClean="0"/>
-              <a:t>)</a:t>
+              <a:t>History of present illness (HPI)</a:t>
             </a:r>
           </a:p>
           <a:p>
             <a:pPr lvl="1"/>
             <a:r>
-              <a:rPr lang="en-US" sz="1600" dirty="0" smtClean="0"/>
-              <a:t>Past </a:t>
-            </a:r>
-            <a:r>
               <a:rPr lang="en-US" sz="1600" dirty="0"/>
-              <a:t>medical history (PMH</a:t>
-            </a:r>
-            <a:r>
-              <a:rPr lang="en-US" sz="1600" dirty="0" smtClean="0"/>
-              <a:t>)</a:t>
+              <a:t>Past medical history (PMH)</a:t>
             </a:r>
           </a:p>
           <a:p>
             <a:pPr lvl="1"/>
             <a:r>
-              <a:rPr lang="en-US" sz="1600" dirty="0" smtClean="0"/>
-              <a:t>Past </a:t>
-            </a:r>
-            <a:r>
               <a:rPr lang="en-US" sz="1600" dirty="0"/>
-              <a:t>surgical history (PSH), including surgery dates and </a:t>
-            </a:r>
-            <a:r>
-              <a:rPr lang="en-US" sz="1600" dirty="0" smtClean="0"/>
-              <a:t>reports</a:t>
+              <a:t>Past surgical history (PSH), including surgery dates and reports</a:t>
             </a:r>
           </a:p>
           <a:p>
             <a:pPr lvl="1"/>
             <a:r>
               <a:rPr lang="en-US" sz="1600" dirty="0"/>
-              <a:t>Family history (e.g. history of certain conditions or diseases in family members</a:t>
-            </a:r>
-            <a:r>
-              <a:rPr lang="en-US" sz="1600" dirty="0" smtClean="0"/>
-              <a:t>)</a:t>
+              <a:t>Family history (e.g. history of certain conditions or diseases in family members)</a:t>
             </a:r>
           </a:p>
           <a:p>
             <a:pPr lvl="1"/>
             <a:r>
               <a:rPr lang="en-US" sz="1600" dirty="0"/>
-              <a:t>Social history (e.g. occupation, family situation, habits such as smoking or exercise</a:t>
-            </a:r>
-            <a:r>
-              <a:rPr lang="en-US" sz="1600" dirty="0" smtClean="0"/>
-              <a:t>)</a:t>
+              <a:t>Social history (e.g. occupation, family situation, habits such as smoking or exercise)</a:t>
             </a:r>
           </a:p>
           <a:p>
             <a:pPr lvl="1"/>
             <a:r>
               <a:rPr lang="en-US" sz="1600" dirty="0"/>
-              <a:t>Immunizations and </a:t>
-            </a:r>
-            <a:r>
-              <a:rPr lang="en-US" sz="1600" dirty="0" smtClean="0"/>
-              <a:t>dates</a:t>
+              <a:t>Immunizations and dates</a:t>
             </a:r>
             <a:endParaRPr lang="en-US" dirty="0"/>
           </a:p>
@@ -4887,7 +4847,7 @@
               <a:buNone/>
             </a:pPr>
             <a:r>
-              <a:rPr lang="en-US" b="1" dirty="0" smtClean="0"/>
+              <a:rPr lang="en-US" b="1" dirty="0"/>
               <a:t>Data Updates</a:t>
             </a:r>
           </a:p>
@@ -4896,11 +4856,11 @@
               <a:buNone/>
             </a:pPr>
             <a:r>
-              <a:rPr lang="en-US" sz="1600" b="1" dirty="0" smtClean="0"/>
+              <a:rPr lang="en-US" sz="1600" b="1" dirty="0"/>
               <a:t>Chart information </a:t>
             </a:r>
             <a:r>
-              <a:rPr lang="en-US" sz="1600" dirty="0" smtClean="0"/>
+              <a:rPr lang="en-US" sz="1600" dirty="0"/>
               <a:t>will be updated on visit if possible (i.e. physical examination will be updated if performed)</a:t>
             </a:r>
           </a:p>
@@ -4915,11 +4875,11 @@
               <a:buNone/>
             </a:pPr>
             <a:r>
-              <a:rPr lang="en-US" sz="1600" b="1" dirty="0" smtClean="0"/>
+              <a:rPr lang="en-US" sz="1600" b="1" dirty="0"/>
               <a:t>Patient History </a:t>
             </a:r>
             <a:r>
-              <a:rPr lang="en-US" sz="1600" dirty="0" smtClean="0"/>
+              <a:rPr lang="en-US" sz="1600" dirty="0"/>
               <a:t>will be updated on visit as it is all history kept of patient</a:t>
             </a:r>
             <a:endParaRPr lang="en-US" sz="1600" b="1" dirty="0"/>
@@ -4972,10 +4932,9 @@
           <a:lstStyle/>
           <a:p>
             <a:r>
-              <a:rPr lang="en-US" dirty="0" smtClean="0"/>
+              <a:rPr lang="en-US" dirty="0"/>
               <a:t>Data Sources &amp; Types</a:t>
             </a:r>
-            <a:endParaRPr lang="en-US" dirty="0"/>
           </a:p>
         </p:txBody>
       </p:sp>
@@ -5253,48 +5212,19 @@
               <a:t>Demographic Data: </a:t>
             </a:r>
             <a:r>
-              <a:rPr lang="en-US" sz="1600" dirty="0" smtClean="0"/>
-              <a:t>U.S</a:t>
-            </a:r>
-            <a:r>
               <a:rPr lang="en-US" sz="1600" dirty="0"/>
-              <a:t>. Census Bureau </a:t>
-            </a:r>
-            <a:r>
-              <a:rPr lang="en-US" sz="1600" dirty="0" smtClean="0"/>
-              <a:t>data, EHRs</a:t>
-            </a:r>
-            <a:endParaRPr lang="en-US" sz="1600" dirty="0"/>
+              <a:t>U.S. Census Bureau data, EHRs</a:t>
+            </a:r>
           </a:p>
           <a:p>
             <a:pPr lvl="1"/>
             <a:r>
-              <a:rPr lang="en-US" sz="1600" b="1" dirty="0" smtClean="0"/>
-              <a:t>Medical </a:t>
-            </a:r>
-            <a:r>
               <a:rPr lang="en-US" sz="1600" b="1" dirty="0"/>
-              <a:t>Data</a:t>
-            </a:r>
-            <a:r>
-              <a:rPr lang="en-US" sz="1600" b="1" dirty="0" smtClean="0"/>
-              <a:t>: </a:t>
-            </a:r>
-            <a:r>
-              <a:rPr lang="en-US" sz="1600" dirty="0" smtClean="0"/>
-              <a:t>Healthcare Cost and Utilization Project (HCUP) data, </a:t>
+              <a:t>Medical Data: </a:t>
             </a:r>
             <a:r>
               <a:rPr lang="en-US" sz="1600" dirty="0"/>
-              <a:t>clinical trial data, CPT codes </a:t>
-            </a:r>
-            <a:r>
-              <a:rPr lang="en-US" sz="1600" dirty="0" smtClean="0"/>
-              <a:t>from </a:t>
-            </a:r>
-            <a:r>
-              <a:rPr lang="en-US" sz="1600" dirty="0"/>
-              <a:t>the AMA, EHRs</a:t>
+              <a:t>Healthcare Cost and Utilization Project (HCUP) data, clinical trial data, CPT codes from the AMA, EHRs</a:t>
             </a:r>
           </a:p>
           <a:p>
@@ -5304,23 +5234,15 @@
               <a:t>Patient History Data: </a:t>
             </a:r>
             <a:r>
-              <a:rPr lang="en-US" sz="1600" dirty="0" smtClean="0"/>
-              <a:t>EHRs</a:t>
-            </a:r>
-            <a:r>
               <a:rPr lang="en-US" sz="1600" dirty="0"/>
-              <a:t>, medical claims data, health questionnaires</a:t>
+              <a:t>EHRs, medical claims data, health questionnaires</a:t>
             </a:r>
           </a:p>
           <a:p>
             <a:pPr lvl="1"/>
             <a:r>
-              <a:rPr lang="en-US" sz="1600" b="1" dirty="0" smtClean="0"/>
-              <a:t>Social </a:t>
-            </a:r>
-            <a:r>
               <a:rPr lang="en-US" sz="1600" b="1" dirty="0"/>
-              <a:t>Determinants of Health Data: </a:t>
+              <a:t>Social Determinants of Health Data: </a:t>
             </a:r>
             <a:r>
               <a:rPr lang="en-US" sz="1600" dirty="0"/>
@@ -5346,15 +5268,7 @@
             </a:r>
             <a:r>
               <a:rPr lang="en-US" sz="1600" dirty="0"/>
-              <a:t>CDC data on infectious diseases, chronic diseases, and injury, WHO data on health equity, </a:t>
-            </a:r>
-            <a:r>
-              <a:rPr lang="en-US" sz="1600" dirty="0" smtClean="0"/>
-              <a:t>non-communicable </a:t>
-            </a:r>
-            <a:r>
-              <a:rPr lang="en-US" sz="1600" dirty="0"/>
-              <a:t>diseases, and environmental health</a:t>
+              <a:t>CDC data on infectious diseases, chronic diseases, and injury, WHO data on health equity, non-communicable diseases, and environmental health</a:t>
             </a:r>
           </a:p>
         </p:txBody>
@@ -5628,7 +5542,7 @@
           </a:lstStyle>
           <a:p>
             <a:pPr lvl="1"/>
-            <a:endParaRPr lang="en-US" sz="1400" dirty="0" smtClean="0"/>
+            <a:endParaRPr lang="en-US" sz="1400" dirty="0"/>
           </a:p>
         </p:txBody>
       </p:sp>
@@ -5903,13 +5817,8 @@
             <a:pPr lvl="1"/>
             <a:r>
               <a:rPr lang="en-US" sz="1600" b="1" dirty="0"/>
-              <a:t>Demographic Data</a:t>
-            </a:r>
-            <a:r>
-              <a:rPr lang="en-US" sz="1600" b="1" dirty="0" smtClean="0"/>
-              <a:t>:</a:t>
-            </a:r>
-            <a:endParaRPr lang="en-US" sz="1600" b="1" dirty="0"/>
+              <a:t>Demographic Data:</a:t>
+            </a:r>
           </a:p>
           <a:p>
             <a:pPr lvl="2"/>
@@ -5929,13 +5838,8 @@
             <a:pPr lvl="1"/>
             <a:r>
               <a:rPr lang="en-US" sz="1600" b="1" dirty="0"/>
-              <a:t>Medical Data</a:t>
-            </a:r>
-            <a:r>
-              <a:rPr lang="en-US" sz="1600" b="1" dirty="0" smtClean="0"/>
-              <a:t>:</a:t>
-            </a:r>
-            <a:endParaRPr lang="en-US" sz="1600" b="1" dirty="0"/>
+              <a:t>Medical Data:</a:t>
+            </a:r>
           </a:p>
           <a:p>
             <a:pPr lvl="2"/>
@@ -5969,13 +5873,8 @@
             <a:pPr lvl="1"/>
             <a:r>
               <a:rPr lang="en-US" sz="1600" b="1" dirty="0"/>
-              <a:t>Patient History Data</a:t>
-            </a:r>
-            <a:r>
-              <a:rPr lang="en-US" sz="1600" b="1" dirty="0" smtClean="0"/>
-              <a:t>:</a:t>
-            </a:r>
-            <a:endParaRPr lang="en-US" sz="1600" b="1" dirty="0"/>
+              <a:t>Patient History Data:</a:t>
+            </a:r>
           </a:p>
           <a:p>
             <a:pPr lvl="2"/>
@@ -5995,13 +5894,8 @@
             <a:pPr lvl="2"/>
             <a:r>
               <a:rPr lang="en-US" sz="1200" dirty="0"/>
-              <a:t>Questionnaires: CSV, Excel, </a:t>
-            </a:r>
-            <a:r>
-              <a:rPr lang="en-US" sz="1200" dirty="0" smtClean="0"/>
-              <a:t>PDF</a:t>
-            </a:r>
-            <a:endParaRPr lang="en-US" sz="1200" dirty="0"/>
+              <a:t>Questionnaires: CSV, Excel, PDF</a:t>
+            </a:r>
           </a:p>
         </p:txBody>
       </p:sp>
@@ -6275,18 +6169,9 @@
           <a:p>
             <a:pPr lvl="1"/>
             <a:r>
-              <a:rPr lang="en-US" sz="1600" b="1" dirty="0" smtClean="0"/>
-              <a:t>Social </a:t>
-            </a:r>
-            <a:r>
               <a:rPr lang="en-US" sz="1600" b="1" dirty="0"/>
-              <a:t>Determinants</a:t>
-            </a:r>
-            <a:r>
-              <a:rPr lang="en-US" sz="1600" b="1" dirty="0" smtClean="0"/>
-              <a:t>:</a:t>
-            </a:r>
-            <a:endParaRPr lang="en-US" sz="1600" b="1" dirty="0"/>
+              <a:t>Social Determinants:</a:t>
+            </a:r>
           </a:p>
           <a:p>
             <a:pPr lvl="2"/>
@@ -6306,13 +6191,8 @@
             <a:pPr lvl="1"/>
             <a:r>
               <a:rPr lang="en-US" sz="1600" b="1" dirty="0"/>
-              <a:t>Patient-Generated Data</a:t>
-            </a:r>
-            <a:r>
-              <a:rPr lang="en-US" sz="1600" b="1" dirty="0" smtClean="0"/>
-              <a:t>:</a:t>
-            </a:r>
-            <a:endParaRPr lang="en-US" sz="1600" b="1" dirty="0"/>
+              <a:t>Patient-Generated Data:</a:t>
+            </a:r>
           </a:p>
           <a:p>
             <a:pPr lvl="2"/>
@@ -6332,13 +6212,8 @@
             <a:pPr lvl="1"/>
             <a:r>
               <a:rPr lang="en-US" sz="1600" b="1" dirty="0"/>
-              <a:t>Public Health Data</a:t>
-            </a:r>
-            <a:r>
-              <a:rPr lang="en-US" sz="1600" b="1" dirty="0" smtClean="0"/>
-              <a:t>:</a:t>
-            </a:r>
-            <a:endParaRPr lang="en-US" sz="1600" b="1" dirty="0"/>
+              <a:t>Public Health Data:</a:t>
+            </a:r>
           </a:p>
           <a:p>
             <a:pPr lvl="2"/>
@@ -6402,10 +6277,9 @@
           <a:lstStyle/>
           <a:p>
             <a:r>
-              <a:rPr lang="en-US" dirty="0" smtClean="0"/>
+              <a:rPr lang="en-US" dirty="0"/>
               <a:t>Analytics</a:t>
             </a:r>
-            <a:endParaRPr lang="en-US" dirty="0"/>
           </a:p>
         </p:txBody>
       </p:sp>
@@ -6681,44 +6555,15 @@
               <a:buNone/>
             </a:pPr>
             <a:r>
-              <a:rPr lang="en-US" b="1" dirty="0" smtClean="0"/>
+              <a:rPr lang="en-US" b="1" dirty="0"/>
               <a:t>     Descriptive Analytics</a:t>
             </a:r>
-            <a:endParaRPr lang="en-US" b="1" dirty="0"/>
           </a:p>
           <a:p>
             <a:pPr lvl="2"/>
             <a:r>
               <a:rPr lang="en-US" dirty="0"/>
-              <a:t>Analyze patient demographics and disease prevalence to understand the population's health status</a:t>
-            </a:r>
-            <a:r>
-              <a:rPr lang="en-US" dirty="0" smtClean="0"/>
-              <a:t>. (</a:t>
-            </a:r>
-            <a:r>
-              <a:rPr lang="en-US" b="1" dirty="0" smtClean="0"/>
-              <a:t>Frequency</a:t>
-            </a:r>
-            <a:r>
-              <a:rPr lang="en-US" dirty="0" smtClean="0"/>
-              <a:t>: Monthly)</a:t>
-            </a:r>
-            <a:endParaRPr lang="en-US" dirty="0"/>
-          </a:p>
-          <a:p>
-            <a:pPr lvl="2"/>
-            <a:r>
-              <a:rPr lang="en-US" dirty="0"/>
-              <a:t>Evaluate hospital admission and discharge rates, lengths of stay, and readmission rates</a:t>
-            </a:r>
-            <a:r>
-              <a:rPr lang="en-US" dirty="0" smtClean="0"/>
-              <a:t>. </a:t>
-            </a:r>
-            <a:r>
-              <a:rPr lang="en-US" dirty="0"/>
-              <a:t>(</a:t>
+              <a:t>Analyze patient demographics and disease prevalence to understand the population's health status. (</a:t>
             </a:r>
             <a:r>
               <a:rPr lang="en-US" b="1" dirty="0"/>
@@ -6726,27 +6571,14 @@
             </a:r>
             <a:r>
               <a:rPr lang="en-US" dirty="0"/>
-              <a:t>: Monthly</a:t>
-            </a:r>
-            <a:r>
-              <a:rPr lang="en-US" dirty="0" smtClean="0"/>
-              <a:t>)</a:t>
-            </a:r>
-            <a:endParaRPr lang="en-US" dirty="0"/>
+              <a:t>: Monthly)</a:t>
+            </a:r>
           </a:p>
           <a:p>
             <a:pPr lvl="2"/>
             <a:r>
               <a:rPr lang="en-US" dirty="0"/>
-              <a:t>Analyze treatment patterns and medication usage to identify best </a:t>
-            </a:r>
-            <a:r>
-              <a:rPr lang="en-US" dirty="0" smtClean="0"/>
-              <a:t>practices. </a:t>
-            </a:r>
-            <a:r>
-              <a:rPr lang="en-US" dirty="0"/>
-              <a:t>(</a:t>
+              <a:t>Evaluate hospital admission and discharge rates, lengths of stay, and readmission rates. (</a:t>
             </a:r>
             <a:r>
               <a:rPr lang="en-US" b="1" dirty="0"/>
@@ -6754,11 +6586,22 @@
             </a:r>
             <a:r>
               <a:rPr lang="en-US" dirty="0"/>
-              <a:t>: Monthly</a:t>
-            </a:r>
-            <a:r>
-              <a:rPr lang="en-US" dirty="0" smtClean="0"/>
-              <a:t>)</a:t>
+              <a:t>: Monthly)</a:t>
+            </a:r>
+          </a:p>
+          <a:p>
+            <a:pPr lvl="2"/>
+            <a:r>
+              <a:rPr lang="en-US" dirty="0"/>
+              <a:t>Analyze treatment patterns and medication usage to identify best practices. (</a:t>
+            </a:r>
+            <a:r>
+              <a:rPr lang="en-US" b="1" dirty="0"/>
+              <a:t>Frequency</a:t>
+            </a:r>
+            <a:r>
+              <a:rPr lang="en-US" dirty="0"/>
+              <a:t>: Monthly)</a:t>
             </a:r>
           </a:p>
           <a:p>
@@ -6770,19 +6613,15 @@
               <a:buNone/>
             </a:pPr>
             <a:r>
-              <a:rPr lang="en-US" sz="1800" b="1" dirty="0" smtClean="0"/>
+              <a:rPr lang="en-US" sz="1800" b="1" dirty="0"/>
               <a:t>Diagnostic Analytics</a:t>
             </a:r>
           </a:p>
           <a:p>
             <a:pPr lvl="2"/>
             <a:r>
-              <a:rPr lang="en-US" dirty="0" smtClean="0"/>
-              <a:t>Identify patterns and correlations between patient characteristics and health outcomes. </a:t>
-            </a:r>
-            <a:r>
               <a:rPr lang="en-US" dirty="0"/>
-              <a:t>(</a:t>
+              <a:t>Identify patterns and correlations between patient characteristics and health outcomes. (</a:t>
             </a:r>
             <a:r>
               <a:rPr lang="en-US" b="1" dirty="0"/>
@@ -6790,34 +6629,18 @@
             </a:r>
             <a:r>
               <a:rPr lang="en-US" dirty="0"/>
-              <a:t>: </a:t>
-            </a:r>
-            <a:r>
-              <a:rPr lang="en-US" dirty="0" smtClean="0"/>
-              <a:t>On Demand)</a:t>
+              <a:t>: On Demand)</a:t>
             </a:r>
           </a:p>
           <a:p>
             <a:pPr lvl="2"/>
             <a:r>
-              <a:rPr lang="en-US" b="1" dirty="0" smtClean="0"/>
+              <a:rPr lang="en-US" b="1" dirty="0"/>
               <a:t>**</a:t>
             </a:r>
             <a:r>
-              <a:rPr lang="en-US" dirty="0" smtClean="0"/>
-              <a:t>Analyze </a:t>
-            </a:r>
-            <a:r>
               <a:rPr lang="en-US" dirty="0"/>
-              <a:t>data to determine factors contributing to hospital readmissions or complications</a:t>
-            </a:r>
-            <a:r>
-              <a:rPr lang="en-US" dirty="0" smtClean="0"/>
-              <a:t>. </a:t>
-            </a:r>
-            <a:r>
-              <a:rPr lang="en-US" dirty="0"/>
-              <a:t>(</a:t>
+              <a:t>Analyze data to determine factors contributing to hospital readmissions or complications. (</a:t>
             </a:r>
             <a:r>
               <a:rPr lang="en-US" b="1" dirty="0"/>
@@ -6825,27 +6648,14 @@
             </a:r>
             <a:r>
               <a:rPr lang="en-US" dirty="0"/>
-              <a:t>: </a:t>
-            </a:r>
-            <a:r>
-              <a:rPr lang="en-US" dirty="0" smtClean="0"/>
-              <a:t>Monthly)</a:t>
-            </a:r>
-            <a:endParaRPr lang="en-US" dirty="0"/>
+              <a:t>: Monthly)</a:t>
+            </a:r>
           </a:p>
           <a:p>
             <a:pPr lvl="2"/>
             <a:r>
               <a:rPr lang="en-US" dirty="0"/>
-              <a:t>Investigate the causes of variations in treatment outcomes and care quality</a:t>
-            </a:r>
-            <a:r>
-              <a:rPr lang="en-US" dirty="0" smtClean="0"/>
-              <a:t>. </a:t>
-            </a:r>
-            <a:r>
-              <a:rPr lang="en-US" dirty="0"/>
-              <a:t>(</a:t>
+              <a:t>Investigate the causes of variations in treatment outcomes and care quality. (</a:t>
             </a:r>
             <a:r>
               <a:rPr lang="en-US" b="1" dirty="0"/>
@@ -7135,27 +6945,14 @@
             </a:pPr>
             <a:r>
               <a:rPr lang="en-US" b="1" dirty="0"/>
-              <a:t>Predictive </a:t>
-            </a:r>
-            <a:r>
-              <a:rPr lang="en-US" b="1" dirty="0" smtClean="0"/>
-              <a:t>Analytics</a:t>
-            </a:r>
-            <a:endParaRPr lang="en-US" b="1" dirty="0"/>
+              <a:t>Predictive Analytics</a:t>
+            </a:r>
           </a:p>
           <a:p>
             <a:pPr lvl="2"/>
             <a:r>
               <a:rPr lang="en-US" dirty="0"/>
-              <a:t>Develop models to predict disease progression or patient risk based on clinical and demographic factors</a:t>
-            </a:r>
-            <a:r>
-              <a:rPr lang="en-US" dirty="0" smtClean="0"/>
-              <a:t>. </a:t>
-            </a:r>
-            <a:r>
-              <a:rPr lang="en-US" dirty="0"/>
-              <a:t>(</a:t>
+              <a:t>Develop models to predict disease progression or patient risk based on clinical and demographic factors. (</a:t>
             </a:r>
             <a:r>
               <a:rPr lang="en-US" b="1" dirty="0"/>
@@ -7163,27 +6960,14 @@
             </a:r>
             <a:r>
               <a:rPr lang="en-US" dirty="0"/>
-              <a:t>: </a:t>
-            </a:r>
-            <a:r>
-              <a:rPr lang="en-US" dirty="0" smtClean="0"/>
-              <a:t>Yearly)</a:t>
-            </a:r>
-            <a:endParaRPr lang="en-US" dirty="0"/>
+              <a:t>: Yearly)</a:t>
+            </a:r>
           </a:p>
           <a:p>
             <a:pPr lvl="2"/>
             <a:r>
               <a:rPr lang="en-US" dirty="0"/>
-              <a:t>Forecast healthcare resource utilization, such as hospital bed or staff requirements</a:t>
-            </a:r>
-            <a:r>
-              <a:rPr lang="en-US" dirty="0" smtClean="0"/>
-              <a:t>. </a:t>
-            </a:r>
-            <a:r>
-              <a:rPr lang="en-US" dirty="0"/>
-              <a:t>(</a:t>
+              <a:t>Forecast healthcare resource utilization, such as hospital bed or staff requirements. (</a:t>
             </a:r>
             <a:r>
               <a:rPr lang="en-US" b="1" dirty="0"/>
@@ -7191,23 +6975,14 @@
             </a:r>
             <a:r>
               <a:rPr lang="en-US" dirty="0"/>
-              <a:t>: </a:t>
-            </a:r>
-            <a:r>
-              <a:rPr lang="en-US" dirty="0" smtClean="0"/>
-              <a:t>Weekly)</a:t>
-            </a:r>
-            <a:endParaRPr lang="en-US" dirty="0"/>
+              <a:t>: Weekly)</a:t>
+            </a:r>
           </a:p>
           <a:p>
             <a:pPr lvl="2"/>
             <a:r>
-              <a:rPr lang="en-US" dirty="0" smtClean="0"/>
-              <a:t>Predict patient adherence to treatment plans or the likelihood of no-show appointments</a:t>
-            </a:r>
-            <a:r>
               <a:rPr lang="en-US" dirty="0"/>
-              <a:t>. (</a:t>
+              <a:t>Predict patient adherence to treatment plans or the likelihood of no-show appointments. (</a:t>
             </a:r>
             <a:r>
               <a:rPr lang="en-US" b="1" dirty="0"/>
@@ -7215,18 +6990,14 @@
             </a:r>
             <a:r>
               <a:rPr lang="en-US" dirty="0"/>
-              <a:t>: </a:t>
-            </a:r>
-            <a:r>
-              <a:rPr lang="en-US" dirty="0" smtClean="0"/>
-              <a:t>Yearly)</a:t>
+              <a:t>: Yearly)</a:t>
             </a:r>
           </a:p>
           <a:p>
             <a:pPr marL="384048" lvl="2" indent="0">
               <a:buNone/>
             </a:pPr>
-            <a:endParaRPr lang="en-US" sz="1800" b="1" dirty="0" smtClean="0"/>
+            <a:endParaRPr lang="en-US" sz="1800" b="1" dirty="0"/>
           </a:p>
           <a:p>
             <a:pPr marL="384048" lvl="2" indent="0" algn="ctr">
@@ -7234,22 +7005,14 @@
             </a:pPr>
             <a:r>
               <a:rPr lang="en-US" sz="1800" b="1" dirty="0"/>
-              <a:t>Prescriptive </a:t>
-            </a:r>
-            <a:r>
-              <a:rPr lang="en-US" sz="1800" b="1" dirty="0" smtClean="0"/>
-              <a:t>Analytics</a:t>
+              <a:t>Prescriptive Analytics</a:t>
             </a:r>
           </a:p>
           <a:p>
             <a:pPr lvl="2"/>
             <a:r>
-              <a:rPr lang="en-US" dirty="0" smtClean="0"/>
-              <a:t>Recommend personalized treatment plans based on patient-specific factors and historical data. </a:t>
-            </a:r>
-            <a:r>
               <a:rPr lang="en-US" dirty="0"/>
-              <a:t>(</a:t>
+              <a:t>Recommend personalized treatment plans based on patient-specific factors and historical data. (</a:t>
             </a:r>
             <a:r>
               <a:rPr lang="en-US" b="1" dirty="0"/>
@@ -7257,30 +7020,14 @@
             </a:r>
             <a:r>
               <a:rPr lang="en-US" dirty="0"/>
-              <a:t>: </a:t>
-            </a:r>
-            <a:r>
-              <a:rPr lang="en-US" dirty="0" smtClean="0"/>
-              <a:t>On Demand)</a:t>
+              <a:t>: On Demand)</a:t>
             </a:r>
           </a:p>
           <a:p>
             <a:pPr lvl="2"/>
             <a:r>
-              <a:rPr lang="en-US" dirty="0" smtClean="0"/>
-              <a:t>Optimize </a:t>
-            </a:r>
-            <a:r>
               <a:rPr lang="en-US" dirty="0"/>
-              <a:t>resource allocation, such as staff scheduling or patient triage, to improve care quality and efficiency</a:t>
-            </a:r>
-            <a:r>
-              <a:rPr lang="en-US" dirty="0" smtClean="0"/>
-              <a:t>. </a:t>
-            </a:r>
-            <a:r>
-              <a:rPr lang="en-US" dirty="0"/>
-              <a:t>(</a:t>
+              <a:t>Optimize resource allocation, such as staff scheduling or patient triage, to improve care quality and efficiency. (</a:t>
             </a:r>
             <a:r>
               <a:rPr lang="en-US" b="1" dirty="0"/>
@@ -7288,27 +7035,14 @@
             </a:r>
             <a:r>
               <a:rPr lang="en-US" dirty="0"/>
-              <a:t>: </a:t>
-            </a:r>
-            <a:r>
-              <a:rPr lang="en-US" dirty="0" smtClean="0"/>
-              <a:t>Weekly)</a:t>
-            </a:r>
-            <a:endParaRPr lang="en-US" dirty="0"/>
+              <a:t>: Weekly)</a:t>
+            </a:r>
           </a:p>
           <a:p>
             <a:pPr lvl="2"/>
             <a:r>
               <a:rPr lang="en-US" dirty="0"/>
-              <a:t>Suggest interventions to improve patient outcomes and prevent complications or readmissions</a:t>
-            </a:r>
-            <a:r>
-              <a:rPr lang="en-US" dirty="0" smtClean="0"/>
-              <a:t>. </a:t>
-            </a:r>
-            <a:r>
-              <a:rPr lang="en-US" dirty="0"/>
-              <a:t>(</a:t>
+              <a:t>Suggest interventions to improve patient outcomes and prevent complications or readmissions. (</a:t>
             </a:r>
             <a:r>
               <a:rPr lang="en-US" b="1" dirty="0"/>
@@ -7316,13 +7050,8 @@
             </a:r>
             <a:r>
               <a:rPr lang="en-US" dirty="0"/>
-              <a:t>: Yearly</a:t>
-            </a:r>
-            <a:r>
-              <a:rPr lang="en-US" dirty="0" smtClean="0"/>
-              <a:t>)</a:t>
-            </a:r>
-            <a:endParaRPr lang="en-US" dirty="0"/>
+              <a:t>: Yearly)</a:t>
+            </a:r>
           </a:p>
           <a:p>
             <a:pPr marL="384048" lvl="2" indent="0">
@@ -7355,10 +7084,9 @@
           <a:lstStyle/>
           <a:p>
             <a:r>
-              <a:rPr lang="en-US" sz="1600" b="1" dirty="0" smtClean="0"/>
+              <a:rPr lang="en-US" sz="1600" b="1" dirty="0"/>
               <a:t>**: Focusing the rest of the assignment on</a:t>
             </a:r>
-            <a:endParaRPr lang="en-US" sz="1600" b="1" dirty="0"/>
           </a:p>
         </p:txBody>
       </p:sp>
@@ -7408,10 +7136,9 @@
           <a:lstStyle/>
           <a:p>
             <a:r>
-              <a:rPr lang="en-US" dirty="0" smtClean="0"/>
+              <a:rPr lang="en-US" dirty="0"/>
               <a:t>Cloud Services</a:t>
             </a:r>
-            <a:endParaRPr lang="en-US" dirty="0"/>
           </a:p>
         </p:txBody>
       </p:sp>
@@ -7425,8 +7152,8 @@
         </p:nvSpPr>
         <p:spPr>
           <a:xfrm>
-            <a:off x="2247900" y="1737361"/>
-            <a:ext cx="4800600" cy="4301490"/>
+            <a:off x="1977555" y="2047462"/>
+            <a:ext cx="5552330" cy="4301490"/>
           </a:xfrm>
           <a:prstGeom prst="rect">
             <a:avLst/>
@@ -7688,143 +7415,421 @@
             </a:pPr>
             <a:r>
               <a:rPr lang="en-US" b="1" dirty="0"/>
-              <a:t>Data </a:t>
-            </a:r>
-            <a:r>
-              <a:rPr lang="en-US" b="1" dirty="0" smtClean="0"/>
-              <a:t>Ingestion: DataSync</a:t>
-            </a:r>
+              <a:t>Data Ingestion: DataSync</a:t>
+            </a:r>
+          </a:p>
+          <a:p>
+            <a:pPr marL="201168" lvl="1" indent="0">
+              <a:buNone/>
+            </a:pPr>
             <a:endParaRPr lang="en-US" b="1" dirty="0"/>
           </a:p>
           <a:p>
             <a:pPr marL="201168" lvl="1" indent="0">
               <a:buNone/>
             </a:pPr>
-            <a:endParaRPr lang="en-US" b="1" dirty="0" smtClean="0"/>
+            <a:r>
+              <a:rPr lang="en-US" b="1" dirty="0"/>
+              <a:t>Data Storage and Data Processing: S3, Lambda </a:t>
+            </a:r>
           </a:p>
           <a:p>
             <a:pPr marL="201168" lvl="1" indent="0">
               <a:buNone/>
             </a:pPr>
-            <a:r>
-              <a:rPr lang="en-US" b="1" dirty="0" smtClean="0"/>
-              <a:t>Data </a:t>
-            </a:r>
+            <a:endParaRPr lang="en-US" b="1" dirty="0"/>
+          </a:p>
+          <a:p>
+            <a:pPr marL="201168" lvl="1" indent="0">
+              <a:buNone/>
+            </a:pPr>
             <a:r>
               <a:rPr lang="en-US" b="1" dirty="0"/>
-              <a:t>Storage </a:t>
-            </a:r>
-            <a:r>
-              <a:rPr lang="en-US" b="1" dirty="0" smtClean="0"/>
-              <a:t>and Data Processing: S3, Lambda </a:t>
+              <a:t>Data Warehousing and BI: RedShift or RDS, QuickSight</a:t>
             </a:r>
           </a:p>
           <a:p>
             <a:pPr marL="201168" lvl="1" indent="0">
               <a:buNone/>
             </a:pPr>
-            <a:endParaRPr lang="en-US" b="1" dirty="0" smtClean="0"/>
+            <a:endParaRPr lang="en-US" b="1" dirty="0"/>
           </a:p>
           <a:p>
             <a:pPr marL="201168" lvl="1" indent="0">
               <a:buNone/>
             </a:pPr>
             <a:r>
-              <a:rPr lang="en-US" b="1" dirty="0" smtClean="0"/>
-              <a:t>Data </a:t>
-            </a:r>
-            <a:r>
               <a:rPr lang="en-US" b="1" dirty="0"/>
-              <a:t>Warehousing and </a:t>
-            </a:r>
-            <a:r>
-              <a:rPr lang="en-US" b="1" dirty="0" smtClean="0"/>
-              <a:t>BI: RedShift, QuickSight</a:t>
-            </a:r>
+              <a:t>Business Intelligence and Analytics: </a:t>
+            </a:r>
+          </a:p>
+          <a:p>
+            <a:pPr marL="201168" lvl="1" indent="0">
+              <a:buNone/>
+            </a:pPr>
             <a:endParaRPr lang="en-US" b="1" dirty="0"/>
           </a:p>
           <a:p>
             <a:pPr marL="201168" lvl="1" indent="0">
               <a:buNone/>
             </a:pPr>
-            <a:endParaRPr lang="en-US" b="1" dirty="0" smtClean="0"/>
+            <a:r>
+              <a:rPr lang="en-US" b="1" dirty="0"/>
+              <a:t>Data Science – ML/AI: </a:t>
+            </a:r>
+            <a:r>
+              <a:rPr lang="en-US" b="1" dirty="0" err="1"/>
+              <a:t>SageMaker</a:t>
+            </a:r>
+            <a:endParaRPr lang="en-US" b="1" dirty="0"/>
           </a:p>
           <a:p>
             <a:pPr marL="201168" lvl="1" indent="0">
               <a:buNone/>
             </a:pPr>
-            <a:r>
-              <a:rPr lang="en-US" b="1" dirty="0" smtClean="0"/>
-              <a:t>Business </a:t>
-            </a:r>
+            <a:endParaRPr lang="en-US" b="1" dirty="0"/>
+          </a:p>
+          <a:p>
+            <a:pPr marL="201168" lvl="1" indent="0">
+              <a:buNone/>
+            </a:pPr>
             <a:r>
               <a:rPr lang="en-US" b="1" dirty="0"/>
-              <a:t>Intelligence and </a:t>
-            </a:r>
-            <a:r>
-              <a:rPr lang="en-US" b="1" dirty="0" smtClean="0"/>
-              <a:t>Analytics: </a:t>
-            </a:r>
-            <a:endParaRPr lang="en-US" b="1" dirty="0"/>
-          </a:p>
-          <a:p>
-            <a:pPr marL="201168" lvl="1" indent="0">
-              <a:buNone/>
-            </a:pPr>
-            <a:endParaRPr lang="en-US" b="1" dirty="0" smtClean="0"/>
-          </a:p>
-          <a:p>
-            <a:pPr marL="201168" lvl="1" indent="0">
-              <a:buNone/>
-            </a:pPr>
-            <a:r>
-              <a:rPr lang="en-US" b="1" dirty="0" smtClean="0"/>
-              <a:t>Data </a:t>
-            </a:r>
-            <a:r>
-              <a:rPr lang="en-US" b="1" dirty="0"/>
-              <a:t>Science </a:t>
-            </a:r>
-            <a:r>
-              <a:rPr lang="en-US" b="1" dirty="0" smtClean="0"/>
-              <a:t>– ML/AI: </a:t>
-            </a:r>
-            <a:endParaRPr lang="en-US" b="1" dirty="0"/>
-          </a:p>
-          <a:p>
-            <a:pPr marL="201168" lvl="1" indent="0">
-              <a:buNone/>
-            </a:pPr>
-            <a:endParaRPr lang="en-US" b="1" dirty="0" smtClean="0"/>
-          </a:p>
-          <a:p>
-            <a:pPr marL="201168" lvl="1" indent="0">
-              <a:buNone/>
-            </a:pPr>
-            <a:r>
-              <a:rPr lang="en-US" b="1" dirty="0" smtClean="0"/>
-              <a:t>Applications </a:t>
-            </a:r>
-            <a:r>
-              <a:rPr lang="en-US" b="1" dirty="0"/>
-              <a:t>– </a:t>
-            </a:r>
-            <a:r>
-              <a:rPr lang="en-US" b="1" dirty="0" smtClean="0"/>
-              <a:t>Webapps</a:t>
-            </a:r>
-            <a:r>
-              <a:rPr lang="en-US" b="1" dirty="0"/>
-              <a:t>, </a:t>
-            </a:r>
-            <a:r>
-              <a:rPr lang="en-US" b="1" dirty="0" smtClean="0"/>
-              <a:t>Mobile: </a:t>
+              <a:t>Applications – Webapps, Mobile: </a:t>
             </a:r>
             <a:endParaRPr lang="en-US" dirty="0"/>
           </a:p>
         </p:txBody>
       </p:sp>
+      <p:pic>
+        <p:nvPicPr>
+          <p:cNvPr id="1026" name="Picture 2" descr="AWS DataSync - AWS Migration &amp; Transfer - AWS Video Catalog">
+            <a:extLst>
+              <a:ext uri="{FF2B5EF4-FFF2-40B4-BE49-F238E27FC236}">
+                <a16:creationId xmlns:a16="http://schemas.microsoft.com/office/drawing/2014/main" id="{CFAB411D-9510-7ED8-E007-EB76A4BC9252}"/>
+              </a:ext>
+            </a:extLst>
+          </p:cNvPr>
+          <p:cNvPicPr>
+            <a:picLocks noChangeAspect="1" noChangeArrowheads="1"/>
+          </p:cNvPicPr>
+          <p:nvPr/>
+        </p:nvPicPr>
+        <p:blipFill>
+          <a:blip r:embed="rId2" cstate="print">
+            <a:extLst>
+              <a:ext uri="{28A0092B-C50C-407E-A947-70E740481C1C}">
+                <a14:useLocalDpi xmlns:a14="http://schemas.microsoft.com/office/drawing/2010/main" val="0"/>
+              </a:ext>
+            </a:extLst>
+          </a:blip>
+          <a:srcRect/>
+          <a:stretch>
+            <a:fillRect/>
+          </a:stretch>
+        </p:blipFill>
+        <p:spPr bwMode="auto">
+          <a:xfrm>
+            <a:off x="1537418" y="1892420"/>
+            <a:ext cx="588397" cy="588397"/>
+          </a:xfrm>
+          <a:prstGeom prst="rect">
+            <a:avLst/>
+          </a:prstGeom>
+          <a:noFill/>
+          <a:extLst>
+            <a:ext uri="{909E8E84-426E-40DD-AFC4-6F175D3DCCD1}">
+              <a14:hiddenFill xmlns:a14="http://schemas.microsoft.com/office/drawing/2010/main">
+                <a:solidFill>
+                  <a:srgbClr val="FFFFFF"/>
+                </a:solidFill>
+              </a14:hiddenFill>
+            </a:ext>
+          </a:extLst>
+        </p:spPr>
+      </p:pic>
+      <p:pic>
+        <p:nvPicPr>
+          <p:cNvPr id="1028" name="Picture 4" descr="Amazon S3 Simple Storage Service Logo PNG Vector (SVG) Free ...">
+            <a:extLst>
+              <a:ext uri="{FF2B5EF4-FFF2-40B4-BE49-F238E27FC236}">
+                <a16:creationId xmlns:a16="http://schemas.microsoft.com/office/drawing/2014/main" id="{16FA8107-B74F-1512-4ADD-8863E9279A2C}"/>
+              </a:ext>
+            </a:extLst>
+          </p:cNvPr>
+          <p:cNvPicPr>
+            <a:picLocks noChangeAspect="1" noChangeArrowheads="1"/>
+          </p:cNvPicPr>
+          <p:nvPr/>
+        </p:nvPicPr>
+        <p:blipFill>
+          <a:blip r:embed="rId3" cstate="print">
+            <a:extLst>
+              <a:ext uri="{28A0092B-C50C-407E-A947-70E740481C1C}">
+                <a14:useLocalDpi xmlns:a14="http://schemas.microsoft.com/office/drawing/2010/main" val="0"/>
+              </a:ext>
+            </a:extLst>
+          </a:blip>
+          <a:srcRect/>
+          <a:stretch>
+            <a:fillRect/>
+          </a:stretch>
+        </p:blipFill>
+        <p:spPr bwMode="auto">
+          <a:xfrm>
+            <a:off x="842837" y="2540451"/>
+            <a:ext cx="588398" cy="588398"/>
+          </a:xfrm>
+          <a:prstGeom prst="rect">
+            <a:avLst/>
+          </a:prstGeom>
+          <a:noFill/>
+          <a:extLst>
+            <a:ext uri="{909E8E84-426E-40DD-AFC4-6F175D3DCCD1}">
+              <a14:hiddenFill xmlns:a14="http://schemas.microsoft.com/office/drawing/2010/main">
+                <a:solidFill>
+                  <a:srgbClr val="FFFFFF"/>
+                </a:solidFill>
+              </a14:hiddenFill>
+            </a:ext>
+          </a:extLst>
+        </p:spPr>
+      </p:pic>
+      <p:pic>
+        <p:nvPicPr>
+          <p:cNvPr id="1030" name="Picture 6">
+            <a:extLst>
+              <a:ext uri="{FF2B5EF4-FFF2-40B4-BE49-F238E27FC236}">
+                <a16:creationId xmlns:a16="http://schemas.microsoft.com/office/drawing/2014/main" id="{2B100B39-DF43-1277-FD25-F9CCE7591909}"/>
+              </a:ext>
+            </a:extLst>
+          </p:cNvPr>
+          <p:cNvPicPr>
+            <a:picLocks noChangeAspect="1" noChangeArrowheads="1"/>
+          </p:cNvPicPr>
+          <p:nvPr/>
+        </p:nvPicPr>
+        <p:blipFill>
+          <a:blip r:embed="rId4" cstate="print">
+            <a:extLst>
+              <a:ext uri="{28A0092B-C50C-407E-A947-70E740481C1C}">
+                <a14:useLocalDpi xmlns:a14="http://schemas.microsoft.com/office/drawing/2010/main" val="0"/>
+              </a:ext>
+            </a:extLst>
+          </a:blip>
+          <a:srcRect/>
+          <a:stretch>
+            <a:fillRect/>
+          </a:stretch>
+        </p:blipFill>
+        <p:spPr bwMode="auto">
+          <a:xfrm>
+            <a:off x="1537418" y="2540451"/>
+            <a:ext cx="588397" cy="588397"/>
+          </a:xfrm>
+          <a:prstGeom prst="rect">
+            <a:avLst/>
+          </a:prstGeom>
+          <a:noFill/>
+          <a:extLst>
+            <a:ext uri="{909E8E84-426E-40DD-AFC4-6F175D3DCCD1}">
+              <a14:hiddenFill xmlns:a14="http://schemas.microsoft.com/office/drawing/2010/main">
+                <a:solidFill>
+                  <a:srgbClr val="FFFFFF"/>
+                </a:solidFill>
+              </a14:hiddenFill>
+            </a:ext>
+          </a:extLst>
+        </p:spPr>
+      </p:pic>
+      <p:pic>
+        <p:nvPicPr>
+          <p:cNvPr id="1032" name="Picture 8" descr="Amazon RDS for PostgreSQL - Workshop">
+            <a:extLst>
+              <a:ext uri="{FF2B5EF4-FFF2-40B4-BE49-F238E27FC236}">
+                <a16:creationId xmlns:a16="http://schemas.microsoft.com/office/drawing/2014/main" id="{05306F5D-B999-0084-DE17-92830A5CB720}"/>
+              </a:ext>
+            </a:extLst>
+          </p:cNvPr>
+          <p:cNvPicPr>
+            <a:picLocks noChangeAspect="1" noChangeArrowheads="1"/>
+          </p:cNvPicPr>
+          <p:nvPr/>
+        </p:nvPicPr>
+        <p:blipFill>
+          <a:blip r:embed="rId5" cstate="print">
+            <a:extLst>
+              <a:ext uri="{28A0092B-C50C-407E-A947-70E740481C1C}">
+                <a14:useLocalDpi xmlns:a14="http://schemas.microsoft.com/office/drawing/2010/main" val="0"/>
+              </a:ext>
+            </a:extLst>
+          </a:blip>
+          <a:srcRect/>
+          <a:stretch>
+            <a:fillRect/>
+          </a:stretch>
+        </p:blipFill>
+        <p:spPr bwMode="auto">
+          <a:xfrm>
+            <a:off x="1540234" y="3180539"/>
+            <a:ext cx="588397" cy="588397"/>
+          </a:xfrm>
+          <a:prstGeom prst="rect">
+            <a:avLst/>
+          </a:prstGeom>
+          <a:noFill/>
+          <a:extLst>
+            <a:ext uri="{909E8E84-426E-40DD-AFC4-6F175D3DCCD1}">
+              <a14:hiddenFill xmlns:a14="http://schemas.microsoft.com/office/drawing/2010/main">
+                <a:solidFill>
+                  <a:srgbClr val="FFFFFF"/>
+                </a:solidFill>
+              </a14:hiddenFill>
+            </a:ext>
+          </a:extLst>
+        </p:spPr>
+      </p:pic>
+      <p:pic>
+        <p:nvPicPr>
+          <p:cNvPr id="1034" name="Picture 10" descr="Amazon QuickSight">
+            <a:extLst>
+              <a:ext uri="{FF2B5EF4-FFF2-40B4-BE49-F238E27FC236}">
+                <a16:creationId xmlns:a16="http://schemas.microsoft.com/office/drawing/2014/main" id="{03E93461-13A2-1A11-FDC5-7E83F44B0D02}"/>
+              </a:ext>
+            </a:extLst>
+          </p:cNvPr>
+          <p:cNvPicPr>
+            <a:picLocks noChangeAspect="1" noChangeArrowheads="1"/>
+          </p:cNvPicPr>
+          <p:nvPr/>
+        </p:nvPicPr>
+        <p:blipFill>
+          <a:blip r:embed="rId6" cstate="print">
+            <a:extLst>
+              <a:ext uri="{28A0092B-C50C-407E-A947-70E740481C1C}">
+                <a14:useLocalDpi xmlns:a14="http://schemas.microsoft.com/office/drawing/2010/main" val="0"/>
+              </a:ext>
+            </a:extLst>
+          </a:blip>
+          <a:srcRect/>
+          <a:stretch>
+            <a:fillRect/>
+          </a:stretch>
+        </p:blipFill>
+        <p:spPr bwMode="auto">
+          <a:xfrm>
+            <a:off x="842837" y="3180539"/>
+            <a:ext cx="588397" cy="588397"/>
+          </a:xfrm>
+          <a:prstGeom prst="rect">
+            <a:avLst/>
+          </a:prstGeom>
+          <a:noFill/>
+          <a:extLst>
+            <a:ext uri="{909E8E84-426E-40DD-AFC4-6F175D3DCCD1}">
+              <a14:hiddenFill xmlns:a14="http://schemas.microsoft.com/office/drawing/2010/main">
+                <a:solidFill>
+                  <a:srgbClr val="FFFFFF"/>
+                </a:solidFill>
+              </a14:hiddenFill>
+            </a:ext>
+          </a:extLst>
+        </p:spPr>
+      </p:pic>
+      <p:pic>
+        <p:nvPicPr>
+          <p:cNvPr id="1036" name="Picture 12" descr="Amazon SageMaker Introduction – Try Machine Learning with Built-in  Algorithms | devnote">
+            <a:extLst>
+              <a:ext uri="{FF2B5EF4-FFF2-40B4-BE49-F238E27FC236}">
+                <a16:creationId xmlns:a16="http://schemas.microsoft.com/office/drawing/2014/main" id="{167DD8F3-FB8C-E626-53BC-B6527E2F8D12}"/>
+              </a:ext>
+            </a:extLst>
+          </p:cNvPr>
+          <p:cNvPicPr>
+            <a:picLocks noChangeAspect="1" noChangeArrowheads="1"/>
+          </p:cNvPicPr>
+          <p:nvPr/>
+        </p:nvPicPr>
+        <p:blipFill>
+          <a:blip r:embed="rId7" cstate="print">
+            <a:extLst>
+              <a:ext uri="{28A0092B-C50C-407E-A947-70E740481C1C}">
+                <a14:useLocalDpi xmlns:a14="http://schemas.microsoft.com/office/drawing/2010/main" val="0"/>
+              </a:ext>
+            </a:extLst>
+          </a:blip>
+          <a:srcRect/>
+          <a:stretch>
+            <a:fillRect/>
+          </a:stretch>
+        </p:blipFill>
+        <p:spPr bwMode="auto">
+          <a:xfrm>
+            <a:off x="1537418" y="4470546"/>
+            <a:ext cx="588398" cy="588398"/>
+          </a:xfrm>
+          <a:prstGeom prst="rect">
+            <a:avLst/>
+          </a:prstGeom>
+          <a:noFill/>
+          <a:extLst>
+            <a:ext uri="{909E8E84-426E-40DD-AFC4-6F175D3DCCD1}">
+              <a14:hiddenFill xmlns:a14="http://schemas.microsoft.com/office/drawing/2010/main">
+                <a:solidFill>
+                  <a:srgbClr val="FFFFFF"/>
+                </a:solidFill>
+              </a14:hiddenFill>
+            </a:ext>
+          </a:extLst>
+        </p:spPr>
+      </p:pic>
+      <p:pic>
+        <p:nvPicPr>
+          <p:cNvPr id="3" name="Picture 12" descr="Amazon SageMaker Introduction – Try Machine Learning with Built-in  Algorithms | devnote">
+            <a:extLst>
+              <a:ext uri="{FF2B5EF4-FFF2-40B4-BE49-F238E27FC236}">
+                <a16:creationId xmlns:a16="http://schemas.microsoft.com/office/drawing/2014/main" id="{FE455899-6AE5-171E-8430-8FCCC67AFFC1}"/>
+              </a:ext>
+            </a:extLst>
+          </p:cNvPr>
+          <p:cNvPicPr>
+            <a:picLocks noChangeAspect="1" noChangeArrowheads="1"/>
+          </p:cNvPicPr>
+          <p:nvPr/>
+        </p:nvPicPr>
+        <p:blipFill>
+          <a:blip r:embed="rId7" cstate="print">
+            <a:extLst>
+              <a:ext uri="{28A0092B-C50C-407E-A947-70E740481C1C}">
+                <a14:useLocalDpi xmlns:a14="http://schemas.microsoft.com/office/drawing/2010/main" val="0"/>
+              </a:ext>
+            </a:extLst>
+          </a:blip>
+          <a:srcRect/>
+          <a:stretch>
+            <a:fillRect/>
+          </a:stretch>
+        </p:blipFill>
+        <p:spPr bwMode="auto">
+          <a:xfrm>
+            <a:off x="1537418" y="4522236"/>
+            <a:ext cx="588398" cy="588398"/>
+          </a:xfrm>
+          <a:prstGeom prst="rect">
+            <a:avLst/>
+          </a:prstGeom>
+          <a:noFill/>
+          <a:extLst>
+            <a:ext uri="{909E8E84-426E-40DD-AFC4-6F175D3DCCD1}">
+              <a14:hiddenFill xmlns:a14="http://schemas.microsoft.com/office/drawing/2010/main">
+                <a:solidFill>
+                  <a:srgbClr val="FFFFFF"/>
+                </a:solidFill>
+              </a14:hiddenFill>
+            </a:ext>
+          </a:extLst>
+        </p:spPr>
+      </p:pic>
     </p:spTree>
     <p:extLst>
       <p:ext uri="{BB962C8B-B14F-4D97-AF65-F5344CB8AC3E}">

</xml_diff>

<commit_message>
Worked on 423 hw
</commit_message>
<xml_diff>
--- a/MSiA 423/hw01/hw01_deck.pptx
+++ b/MSiA 423/hw01/hw01_deck.pptx
@@ -7445,7 +7445,7 @@
             </a:pPr>
             <a:r>
               <a:rPr lang="en-US" b="1" dirty="0"/>
-              <a:t>Data Warehousing and BI: RedShift or RDS, QuickSight</a:t>
+              <a:t>Data Warehousing: RedShift or RDS</a:t>
             </a:r>
           </a:p>
           <a:p>
@@ -7460,7 +7460,7 @@
             </a:pPr>
             <a:r>
               <a:rPr lang="en-US" b="1" dirty="0"/>
-              <a:t>Business Intelligence and Analytics: </a:t>
+              <a:t>Business Intelligence and Analytics: QuickSight </a:t>
             </a:r>
           </a:p>
           <a:p>
@@ -7475,13 +7475,8 @@
             </a:pPr>
             <a:r>
               <a:rPr lang="en-US" b="1" dirty="0"/>
-              <a:t>Data Science – ML/AI: </a:t>
-            </a:r>
-            <a:r>
-              <a:rPr lang="en-US" b="1" dirty="0" err="1"/>
-              <a:t>SageMaker</a:t>
-            </a:r>
-            <a:endParaRPr lang="en-US" b="1" dirty="0"/>
+              <a:t>Data Science – ML/AI: SageMaker</a:t>
+            </a:r>
           </a:p>
           <a:p>
             <a:pPr marL="201168" lvl="1" indent="0">
@@ -7495,7 +7490,7 @@
             </a:pPr>
             <a:r>
               <a:rPr lang="en-US" b="1" dirty="0"/>
-              <a:t>Applications – Webapps, Mobile: </a:t>
+              <a:t>Applications – Webapps, Mobile: Gateway</a:t>
             </a:r>
             <a:endParaRPr lang="en-US" dirty="0"/>
           </a:p>
@@ -7718,7 +7713,7 @@
         </p:blipFill>
         <p:spPr bwMode="auto">
           <a:xfrm>
-            <a:off x="842837" y="3180539"/>
+            <a:off x="1537418" y="3830459"/>
             <a:ext cx="588397" cy="588397"/>
           </a:xfrm>
           <a:prstGeom prst="rect">

</xml_diff>